<commit_message>
tweeks after first workshop plus completed pad
</commit_message>
<xml_diff>
--- a/instructors/01_Wellcome_Episode.pptx
+++ b/instructors/01_Wellcome_Episode.pptx
@@ -248,7 +248,7 @@
           <a:p>
             <a:fld id="{CC29EC85-173F-467E-B364-65AD14726A23}" type="datetimeFigureOut">
               <a:rPr lang="en-GB" smtClean="0"/>
-              <a:t>18/10/2021</a:t>
+              <a:t>19/10/2021</a:t>
             </a:fld>
             <a:endParaRPr lang="en-GB"/>
           </a:p>
@@ -418,7 +418,7 @@
           <a:p>
             <a:fld id="{CC29EC85-173F-467E-B364-65AD14726A23}" type="datetimeFigureOut">
               <a:rPr lang="en-GB" smtClean="0"/>
-              <a:t>18/10/2021</a:t>
+              <a:t>19/10/2021</a:t>
             </a:fld>
             <a:endParaRPr lang="en-GB"/>
           </a:p>
@@ -598,7 +598,7 @@
           <a:p>
             <a:fld id="{CC29EC85-173F-467E-B364-65AD14726A23}" type="datetimeFigureOut">
               <a:rPr lang="en-GB" smtClean="0"/>
-              <a:t>18/10/2021</a:t>
+              <a:t>19/10/2021</a:t>
             </a:fld>
             <a:endParaRPr lang="en-GB"/>
           </a:p>
@@ -768,7 +768,7 @@
           <a:p>
             <a:fld id="{CC29EC85-173F-467E-B364-65AD14726A23}" type="datetimeFigureOut">
               <a:rPr lang="en-GB" smtClean="0"/>
-              <a:t>18/10/2021</a:t>
+              <a:t>19/10/2021</a:t>
             </a:fld>
             <a:endParaRPr lang="en-GB"/>
           </a:p>
@@ -1014,7 +1014,7 @@
           <a:p>
             <a:fld id="{CC29EC85-173F-467E-B364-65AD14726A23}" type="datetimeFigureOut">
               <a:rPr lang="en-GB" smtClean="0"/>
-              <a:t>18/10/2021</a:t>
+              <a:t>19/10/2021</a:t>
             </a:fld>
             <a:endParaRPr lang="en-GB"/>
           </a:p>
@@ -1246,7 +1246,7 @@
           <a:p>
             <a:fld id="{CC29EC85-173F-467E-B364-65AD14726A23}" type="datetimeFigureOut">
               <a:rPr lang="en-GB" smtClean="0"/>
-              <a:t>18/10/2021</a:t>
+              <a:t>19/10/2021</a:t>
             </a:fld>
             <a:endParaRPr lang="en-GB"/>
           </a:p>
@@ -1613,7 +1613,7 @@
           <a:p>
             <a:fld id="{CC29EC85-173F-467E-B364-65AD14726A23}" type="datetimeFigureOut">
               <a:rPr lang="en-GB" smtClean="0"/>
-              <a:t>18/10/2021</a:t>
+              <a:t>19/10/2021</a:t>
             </a:fld>
             <a:endParaRPr lang="en-GB"/>
           </a:p>
@@ -1731,7 +1731,7 @@
           <a:p>
             <a:fld id="{CC29EC85-173F-467E-B364-65AD14726A23}" type="datetimeFigureOut">
               <a:rPr lang="en-GB" smtClean="0"/>
-              <a:t>18/10/2021</a:t>
+              <a:t>19/10/2021</a:t>
             </a:fld>
             <a:endParaRPr lang="en-GB"/>
           </a:p>
@@ -1826,7 +1826,7 @@
           <a:p>
             <a:fld id="{CC29EC85-173F-467E-B364-65AD14726A23}" type="datetimeFigureOut">
               <a:rPr lang="en-GB" smtClean="0"/>
-              <a:t>18/10/2021</a:t>
+              <a:t>19/10/2021</a:t>
             </a:fld>
             <a:endParaRPr lang="en-GB"/>
           </a:p>
@@ -2103,7 +2103,7 @@
           <a:p>
             <a:fld id="{CC29EC85-173F-467E-B364-65AD14726A23}" type="datetimeFigureOut">
               <a:rPr lang="en-GB" smtClean="0"/>
-              <a:t>18/10/2021</a:t>
+              <a:t>19/10/2021</a:t>
             </a:fld>
             <a:endParaRPr lang="en-GB"/>
           </a:p>
@@ -2356,7 +2356,7 @@
           <a:p>
             <a:fld id="{CC29EC85-173F-467E-B364-65AD14726A23}" type="datetimeFigureOut">
               <a:rPr lang="en-GB" smtClean="0"/>
-              <a:t>18/10/2021</a:t>
+              <a:t>19/10/2021</a:t>
             </a:fld>
             <a:endParaRPr lang="en-GB"/>
           </a:p>
@@ -2569,7 +2569,7 @@
           <a:p>
             <a:fld id="{CC29EC85-173F-467E-B364-65AD14726A23}" type="datetimeFigureOut">
               <a:rPr lang="en-GB" smtClean="0"/>
-              <a:t>18/10/2021</a:t>
+              <a:t>19/10/2021</a:t>
             </a:fld>
             <a:endParaRPr lang="en-GB"/>
           </a:p>
@@ -4389,7 +4389,7 @@
             <a:effectLst/>
             <a:extLst>
               <a:ext uri="{AF507438-7753-43e0-B8FC-AC1667EBCBE1}">
-                <a14:hiddenEffects xmlns:a14="http://schemas.microsoft.com/office/drawing/2010/main" xmlns="">
+                <a14:hiddenEffects xmlns="" xmlns:a14="http://schemas.microsoft.com/office/drawing/2010/main">
                   <a:effectLst>
                     <a:outerShdw dist="35921" dir="2700000" algn="ctr" rotWithShape="0">
                       <a:schemeClr val="bg2"/>
@@ -4451,7 +4451,7 @@
             <a:effectLst/>
             <a:extLst>
               <a:ext uri="{AF507438-7753-43e0-B8FC-AC1667EBCBE1}">
-                <a14:hiddenEffects xmlns:a14="http://schemas.microsoft.com/office/drawing/2010/main" xmlns="">
+                <a14:hiddenEffects xmlns="" xmlns:a14="http://schemas.microsoft.com/office/drawing/2010/main">
                   <a:effectLst>
                     <a:outerShdw dist="35921" dir="2700000" algn="ctr" rotWithShape="0">
                       <a:schemeClr val="bg2"/>
@@ -4513,7 +4513,7 @@
             <a:effectLst/>
             <a:extLst>
               <a:ext uri="{AF507438-7753-43e0-B8FC-AC1667EBCBE1}">
-                <a14:hiddenEffects xmlns:a14="http://schemas.microsoft.com/office/drawing/2010/main" xmlns="">
+                <a14:hiddenEffects xmlns="" xmlns:a14="http://schemas.microsoft.com/office/drawing/2010/main">
                   <a:effectLst>
                     <a:outerShdw dist="35921" dir="2700000" algn="ctr" rotWithShape="0">
                       <a:schemeClr val="bg2"/>
@@ -4712,7 +4712,7 @@
           <a:effectLst/>
           <a:extLst>
             <a:ext uri="{AF507438-7753-43e0-B8FC-AC1667EBCBE1}">
-              <a14:hiddenEffects xmlns:a14="http://schemas.microsoft.com/office/drawing/2010/main" xmlns="">
+              <a14:hiddenEffects xmlns="" xmlns:a14="http://schemas.microsoft.com/office/drawing/2010/main">
                 <a:effectLst>
                   <a:outerShdw dist="35921" dir="2700000" algn="ctr" rotWithShape="0">
                     <a:schemeClr val="bg2"/>
@@ -5043,7 +5043,7 @@
             <a:effectLst/>
             <a:extLst>
               <a:ext uri="{AF507438-7753-43e0-B8FC-AC1667EBCBE1}">
-                <a14:hiddenEffects xmlns:a14="http://schemas.microsoft.com/office/drawing/2010/main" xmlns="">
+                <a14:hiddenEffects xmlns="" xmlns:a14="http://schemas.microsoft.com/office/drawing/2010/main">
                   <a:effectLst>
                     <a:outerShdw dist="35921" dir="2700000" algn="ctr" rotWithShape="0">
                       <a:schemeClr val="bg2"/>
@@ -5105,7 +5105,7 @@
             <a:effectLst/>
             <a:extLst>
               <a:ext uri="{AF507438-7753-43e0-B8FC-AC1667EBCBE1}">
-                <a14:hiddenEffects xmlns:a14="http://schemas.microsoft.com/office/drawing/2010/main" xmlns="">
+                <a14:hiddenEffects xmlns="" xmlns:a14="http://schemas.microsoft.com/office/drawing/2010/main">
                   <a:effectLst>
                     <a:outerShdw dist="35921" dir="2700000" algn="ctr" rotWithShape="0">
                       <a:schemeClr val="bg2"/>
@@ -5182,7 +5182,7 @@
             <a:effectLst/>
             <a:extLst>
               <a:ext uri="{AF507438-7753-43e0-B8FC-AC1667EBCBE1}">
-                <a14:hiddenEffects xmlns:a14="http://schemas.microsoft.com/office/drawing/2010/main" xmlns="">
+                <a14:hiddenEffects xmlns="" xmlns:a14="http://schemas.microsoft.com/office/drawing/2010/main">
                   <a:effectLst>
                     <a:outerShdw dist="35921" dir="2700000" algn="ctr" rotWithShape="0">
                       <a:schemeClr val="bg2"/>
@@ -5244,7 +5244,7 @@
             <a:effectLst/>
             <a:extLst>
               <a:ext uri="{AF507438-7753-43e0-B8FC-AC1667EBCBE1}">
-                <a14:hiddenEffects xmlns:a14="http://schemas.microsoft.com/office/drawing/2010/main" xmlns="">
+                <a14:hiddenEffects xmlns="" xmlns:a14="http://schemas.microsoft.com/office/drawing/2010/main">
                   <a:effectLst>
                     <a:outerShdw dist="35921" dir="2700000" algn="ctr" rotWithShape="0">
                       <a:schemeClr val="bg2"/>
@@ -6477,7 +6477,7 @@
           <a:effectLst/>
           <a:extLst>
             <a:ext uri="{AF507438-7753-43e0-B8FC-AC1667EBCBE1}">
-              <a14:hiddenEffects xmlns:a14="http://schemas.microsoft.com/office/drawing/2010/main" xmlns="">
+              <a14:hiddenEffects xmlns="" xmlns:a14="http://schemas.microsoft.com/office/drawing/2010/main">
                 <a:effectLst>
                   <a:outerShdw dist="35921" dir="2700000" algn="ctr" rotWithShape="0">
                     <a:schemeClr val="bg2"/>
@@ -6820,11 +6820,19 @@
           <a:p>
             <a:r>
               <a:rPr lang="pl-PL" sz="4000" dirty="0"/>
-              <a:t>Day 2: ELN, (meta)data in Excel</a:t>
+              <a:t>Day 2: (meta)data in Excel</a:t>
             </a:r>
             <a:r>
               <a:rPr lang="en-GB" sz="4000" dirty="0"/>
-              <a:t>, files</a:t>
+              <a:t>, </a:t>
+            </a:r>
+            <a:r>
+              <a:rPr lang="pl-PL" sz="4000" dirty="0"/>
+              <a:t>ELN, </a:t>
+            </a:r>
+            <a:r>
+              <a:rPr lang="en-GB" sz="4000" dirty="0"/>
+              <a:t>files</a:t>
             </a:r>
             <a:endParaRPr lang="pl-PL" sz="4000" dirty="0"/>
           </a:p>
@@ -6939,7 +6947,7 @@
         </p:spPr>
         <p:txBody>
           <a:bodyPr>
-            <a:normAutofit fontScale="92500" lnSpcReduction="10000"/>
+            <a:normAutofit fontScale="92500" lnSpcReduction="20000"/>
           </a:bodyPr>
           <a:lstStyle/>
           <a:p>
@@ -6989,11 +6997,14 @@
             </a:r>
             <a:r>
               <a:rPr lang="en-GB" sz="4000" dirty="0"/>
-              <a:t>here to </a:t>
-            </a:r>
-            <a:r>
-              <a:rPr lang="en-GB" sz="4000"/>
-              <a:t>find things</a:t>
+              <a:t>here to find things</a:t>
+            </a:r>
+            <a:endParaRPr lang="pl-PL" sz="4000" dirty="0"/>
+          </a:p>
+          <a:p>
+            <a:r>
+              <a:rPr lang="pl-PL" sz="4000" dirty="0"/>
+              <a:t>VPN</a:t>
             </a:r>
             <a:endParaRPr lang="en-GB" sz="4000" dirty="0"/>
           </a:p>

</xml_diff>